<commit_message>
Make Agenda Sync tests harder for more coverage
</commit_message>
<xml_diff>
--- a/doc/test/AgendaSlidesVisualBeforeSync.pptx
+++ b/doc/test/AgendaSlidesVisualBeforeSync.pptx
@@ -190,7 +190,7 @@
       </p14:sectionLst>
     </p:ext>
     <p:ext uri="{EFAFB233-063F-42B5-8137-9DF3F51BA10A}">
-      <p15:sldGuideLst xmlns:p15="http://schemas.microsoft.com/office/powerpoint/2012/main" xmlns="">
+      <p15:sldGuideLst xmlns="" xmlns:p15="http://schemas.microsoft.com/office/powerpoint/2012/main">
         <p15:guide id="1" orient="horz" pos="2160">
           <p15:clr>
             <a:srgbClr val="A4A3A4"/>
@@ -289,7 +289,7 @@
           <a:p>
             <a:fld id="{C33977A5-270E-4E03-B118-17345E304686}" type="datetimeFigureOut">
               <a:rPr lang="en-US" smtClean="0"/>
-              <a:t>19-Jun-15</a:t>
+              <a:t>24-Jun-15</a:t>
             </a:fld>
             <a:endParaRPr lang="en-US"/>
           </a:p>
@@ -826,7 +826,7 @@
           <a:p>
             <a:fld id="{699DC775-C286-4358-8C92-D7E584E969B3}" type="datetimeFigureOut">
               <a:rPr lang="en-US" smtClean="0"/>
-              <a:t>19-Jun-15</a:t>
+              <a:t>24-Jun-15</a:t>
             </a:fld>
             <a:endParaRPr lang="en-US"/>
           </a:p>
@@ -996,7 +996,7 @@
           <a:p>
             <a:fld id="{699DC775-C286-4358-8C92-D7E584E969B3}" type="datetimeFigureOut">
               <a:rPr lang="en-US" smtClean="0"/>
-              <a:t>19-Jun-15</a:t>
+              <a:t>24-Jun-15</a:t>
             </a:fld>
             <a:endParaRPr lang="en-US"/>
           </a:p>
@@ -1176,7 +1176,7 @@
           <a:p>
             <a:fld id="{699DC775-C286-4358-8C92-D7E584E969B3}" type="datetimeFigureOut">
               <a:rPr lang="en-US" smtClean="0"/>
-              <a:t>19-Jun-15</a:t>
+              <a:t>24-Jun-15</a:t>
             </a:fld>
             <a:endParaRPr lang="en-US"/>
           </a:p>
@@ -1346,7 +1346,7 @@
           <a:p>
             <a:fld id="{699DC775-C286-4358-8C92-D7E584E969B3}" type="datetimeFigureOut">
               <a:rPr lang="en-US" smtClean="0"/>
-              <a:t>19-Jun-15</a:t>
+              <a:t>24-Jun-15</a:t>
             </a:fld>
             <a:endParaRPr lang="en-US"/>
           </a:p>
@@ -1588,7 +1588,7 @@
           <a:p>
             <a:fld id="{699DC775-C286-4358-8C92-D7E584E969B3}" type="datetimeFigureOut">
               <a:rPr lang="en-US" smtClean="0"/>
-              <a:t>19-Jun-15</a:t>
+              <a:t>24-Jun-15</a:t>
             </a:fld>
             <a:endParaRPr lang="en-US"/>
           </a:p>
@@ -1758,7 +1758,7 @@
           <a:p>
             <a:fld id="{699DC775-C286-4358-8C92-D7E584E969B3}" type="datetimeFigureOut">
               <a:rPr lang="en-US" smtClean="0"/>
-              <a:t>19-Jun-15</a:t>
+              <a:t>24-Jun-15</a:t>
             </a:fld>
             <a:endParaRPr lang="en-US"/>
           </a:p>
@@ -2004,7 +2004,7 @@
           <a:p>
             <a:fld id="{699DC775-C286-4358-8C92-D7E584E969B3}" type="datetimeFigureOut">
               <a:rPr lang="en-US" smtClean="0"/>
-              <a:t>19-Jun-15</a:t>
+              <a:t>24-Jun-15</a:t>
             </a:fld>
             <a:endParaRPr lang="en-US"/>
           </a:p>
@@ -2292,7 +2292,7 @@
           <a:p>
             <a:fld id="{699DC775-C286-4358-8C92-D7E584E969B3}" type="datetimeFigureOut">
               <a:rPr lang="en-US" smtClean="0"/>
-              <a:t>19-Jun-15</a:t>
+              <a:t>24-Jun-15</a:t>
             </a:fld>
             <a:endParaRPr lang="en-US"/>
           </a:p>
@@ -2714,7 +2714,7 @@
           <a:p>
             <a:fld id="{699DC775-C286-4358-8C92-D7E584E969B3}" type="datetimeFigureOut">
               <a:rPr lang="en-US" smtClean="0"/>
-              <a:t>19-Jun-15</a:t>
+              <a:t>24-Jun-15</a:t>
             </a:fld>
             <a:endParaRPr lang="en-US"/>
           </a:p>
@@ -2832,7 +2832,7 @@
           <a:p>
             <a:fld id="{699DC775-C286-4358-8C92-D7E584E969B3}" type="datetimeFigureOut">
               <a:rPr lang="en-US" smtClean="0"/>
-              <a:t>19-Jun-15</a:t>
+              <a:t>24-Jun-15</a:t>
             </a:fld>
             <a:endParaRPr lang="en-US"/>
           </a:p>
@@ -2927,7 +2927,7 @@
           <a:p>
             <a:fld id="{699DC775-C286-4358-8C92-D7E584E969B3}" type="datetimeFigureOut">
               <a:rPr lang="en-US" smtClean="0"/>
-              <a:t>19-Jun-15</a:t>
+              <a:t>24-Jun-15</a:t>
             </a:fld>
             <a:endParaRPr lang="en-US"/>
           </a:p>
@@ -3097,7 +3097,7 @@
           <a:p>
             <a:fld id="{699DC775-C286-4358-8C92-D7E584E969B3}" type="datetimeFigureOut">
               <a:rPr lang="en-US" smtClean="0"/>
-              <a:t>19-Jun-15</a:t>
+              <a:t>24-Jun-15</a:t>
             </a:fld>
             <a:endParaRPr lang="en-US"/>
           </a:p>
@@ -3374,7 +3374,7 @@
           <a:p>
             <a:fld id="{699DC775-C286-4358-8C92-D7E584E969B3}" type="datetimeFigureOut">
               <a:rPr lang="en-US" smtClean="0"/>
-              <a:t>19-Jun-15</a:t>
+              <a:t>24-Jun-15</a:t>
             </a:fld>
             <a:endParaRPr lang="en-US"/>
           </a:p>
@@ -3627,7 +3627,7 @@
           <a:p>
             <a:fld id="{699DC775-C286-4358-8C92-D7E584E969B3}" type="datetimeFigureOut">
               <a:rPr lang="en-US" smtClean="0"/>
-              <a:t>19-Jun-15</a:t>
+              <a:t>24-Jun-15</a:t>
             </a:fld>
             <a:endParaRPr lang="en-US"/>
           </a:p>
@@ -3797,7 +3797,7 @@
           <a:p>
             <a:fld id="{699DC775-C286-4358-8C92-D7E584E969B3}" type="datetimeFigureOut">
               <a:rPr lang="en-US" smtClean="0"/>
-              <a:t>19-Jun-15</a:t>
+              <a:t>24-Jun-15</a:t>
             </a:fld>
             <a:endParaRPr lang="en-US"/>
           </a:p>
@@ -3977,7 +3977,7 @@
           <a:p>
             <a:fld id="{699DC775-C286-4358-8C92-D7E584E969B3}" type="datetimeFigureOut">
               <a:rPr lang="en-US" smtClean="0"/>
-              <a:t>19-Jun-15</a:t>
+              <a:t>24-Jun-15</a:t>
             </a:fld>
             <a:endParaRPr lang="en-US"/>
           </a:p>
@@ -4147,7 +4147,7 @@
           <a:p>
             <a:fld id="{699DC775-C286-4358-8C92-D7E584E969B3}" type="datetimeFigureOut">
               <a:rPr lang="en-US" smtClean="0"/>
-              <a:t>19-Jun-15</a:t>
+              <a:t>24-Jun-15</a:t>
             </a:fld>
             <a:endParaRPr lang="en-US"/>
           </a:p>
@@ -4397,7 +4397,7 @@
           <a:p>
             <a:fld id="{699DC775-C286-4358-8C92-D7E584E969B3}" type="datetimeFigureOut">
               <a:rPr lang="en-US" smtClean="0"/>
-              <a:t>19-Jun-15</a:t>
+              <a:t>24-Jun-15</a:t>
             </a:fld>
             <a:endParaRPr lang="en-US"/>
           </a:p>
@@ -4575,7 +4575,7 @@
           <a:p>
             <a:fld id="{699DC775-C286-4358-8C92-D7E584E969B3}" type="datetimeFigureOut">
               <a:rPr lang="en-US" smtClean="0"/>
-              <a:t>19-Jun-15</a:t>
+              <a:t>24-Jun-15</a:t>
             </a:fld>
             <a:endParaRPr lang="en-US"/>
           </a:p>
@@ -4829,7 +4829,7 @@
           <a:p>
             <a:fld id="{699DC775-C286-4358-8C92-D7E584E969B3}" type="datetimeFigureOut">
               <a:rPr lang="en-US" smtClean="0"/>
-              <a:t>19-Jun-15</a:t>
+              <a:t>24-Jun-15</a:t>
             </a:fld>
             <a:endParaRPr lang="en-US"/>
           </a:p>
@@ -5125,7 +5125,7 @@
           <a:p>
             <a:fld id="{699DC775-C286-4358-8C92-D7E584E969B3}" type="datetimeFigureOut">
               <a:rPr lang="en-US" smtClean="0"/>
-              <a:t>19-Jun-15</a:t>
+              <a:t>24-Jun-15</a:t>
             </a:fld>
             <a:endParaRPr lang="en-US"/>
           </a:p>
@@ -5555,7 +5555,7 @@
           <a:p>
             <a:fld id="{699DC775-C286-4358-8C92-D7E584E969B3}" type="datetimeFigureOut">
               <a:rPr lang="en-US" smtClean="0"/>
-              <a:t>19-Jun-15</a:t>
+              <a:t>24-Jun-15</a:t>
             </a:fld>
             <a:endParaRPr lang="en-US"/>
           </a:p>
@@ -5801,7 +5801,7 @@
           <a:p>
             <a:fld id="{699DC775-C286-4358-8C92-D7E584E969B3}" type="datetimeFigureOut">
               <a:rPr lang="en-US" smtClean="0"/>
-              <a:t>19-Jun-15</a:t>
+              <a:t>24-Jun-15</a:t>
             </a:fld>
             <a:endParaRPr lang="en-US"/>
           </a:p>
@@ -5927,7 +5927,7 @@
           <a:p>
             <a:fld id="{699DC775-C286-4358-8C92-D7E584E969B3}" type="datetimeFigureOut">
               <a:rPr lang="en-US" smtClean="0"/>
-              <a:t>19-Jun-15</a:t>
+              <a:t>24-Jun-15</a:t>
             </a:fld>
             <a:endParaRPr lang="en-US"/>
           </a:p>
@@ -6030,7 +6030,7 @@
           <a:p>
             <a:fld id="{699DC775-C286-4358-8C92-D7E584E969B3}" type="datetimeFigureOut">
               <a:rPr lang="en-US" smtClean="0"/>
-              <a:t>19-Jun-15</a:t>
+              <a:t>24-Jun-15</a:t>
             </a:fld>
             <a:endParaRPr lang="en-US"/>
           </a:p>
@@ -6315,7 +6315,7 @@
           <a:p>
             <a:fld id="{699DC775-C286-4358-8C92-D7E584E969B3}" type="datetimeFigureOut">
               <a:rPr lang="en-US" smtClean="0"/>
-              <a:t>19-Jun-15</a:t>
+              <a:t>24-Jun-15</a:t>
             </a:fld>
             <a:endParaRPr lang="en-US"/>
           </a:p>
@@ -6576,7 +6576,7 @@
           <a:p>
             <a:fld id="{699DC775-C286-4358-8C92-D7E584E969B3}" type="datetimeFigureOut">
               <a:rPr lang="en-US" smtClean="0"/>
-              <a:t>19-Jun-15</a:t>
+              <a:t>24-Jun-15</a:t>
             </a:fld>
             <a:endParaRPr lang="en-US"/>
           </a:p>
@@ -6754,7 +6754,7 @@
           <a:p>
             <a:fld id="{699DC775-C286-4358-8C92-D7E584E969B3}" type="datetimeFigureOut">
               <a:rPr lang="en-US" smtClean="0"/>
-              <a:t>19-Jun-15</a:t>
+              <a:t>24-Jun-15</a:t>
             </a:fld>
             <a:endParaRPr lang="en-US"/>
           </a:p>
@@ -6942,7 +6942,7 @@
           <a:p>
             <a:fld id="{699DC775-C286-4358-8C92-D7E584E969B3}" type="datetimeFigureOut">
               <a:rPr lang="en-US" smtClean="0"/>
-              <a:t>19-Jun-15</a:t>
+              <a:t>24-Jun-15</a:t>
             </a:fld>
             <a:endParaRPr lang="en-US"/>
           </a:p>
@@ -7112,7 +7112,7 @@
           <a:p>
             <a:fld id="{699DC775-C286-4358-8C92-D7E584E969B3}" type="datetimeFigureOut">
               <a:rPr lang="en-US" smtClean="0"/>
-              <a:t>19-Jun-15</a:t>
+              <a:t>24-Jun-15</a:t>
             </a:fld>
             <a:endParaRPr lang="en-US"/>
           </a:p>
@@ -7400,7 +7400,7 @@
           <a:p>
             <a:fld id="{699DC775-C286-4358-8C92-D7E584E969B3}" type="datetimeFigureOut">
               <a:rPr lang="en-US" smtClean="0"/>
-              <a:t>19-Jun-15</a:t>
+              <a:t>24-Jun-15</a:t>
             </a:fld>
             <a:endParaRPr lang="en-US"/>
           </a:p>
@@ -7822,7 +7822,7 @@
           <a:p>
             <a:fld id="{699DC775-C286-4358-8C92-D7E584E969B3}" type="datetimeFigureOut">
               <a:rPr lang="en-US" smtClean="0"/>
-              <a:t>19-Jun-15</a:t>
+              <a:t>24-Jun-15</a:t>
             </a:fld>
             <a:endParaRPr lang="en-US"/>
           </a:p>
@@ -7940,7 +7940,7 @@
           <a:p>
             <a:fld id="{699DC775-C286-4358-8C92-D7E584E969B3}" type="datetimeFigureOut">
               <a:rPr lang="en-US" smtClean="0"/>
-              <a:t>19-Jun-15</a:t>
+              <a:t>24-Jun-15</a:t>
             </a:fld>
             <a:endParaRPr lang="en-US"/>
           </a:p>
@@ -8035,7 +8035,7 @@
           <a:p>
             <a:fld id="{699DC775-C286-4358-8C92-D7E584E969B3}" type="datetimeFigureOut">
               <a:rPr lang="en-US" smtClean="0"/>
-              <a:t>19-Jun-15</a:t>
+              <a:t>24-Jun-15</a:t>
             </a:fld>
             <a:endParaRPr lang="en-US"/>
           </a:p>
@@ -8312,7 +8312,7 @@
           <a:p>
             <a:fld id="{699DC775-C286-4358-8C92-D7E584E969B3}" type="datetimeFigureOut">
               <a:rPr lang="en-US" smtClean="0"/>
-              <a:t>19-Jun-15</a:t>
+              <a:t>24-Jun-15</a:t>
             </a:fld>
             <a:endParaRPr lang="en-US"/>
           </a:p>
@@ -8565,7 +8565,7 @@
           <a:p>
             <a:fld id="{699DC775-C286-4358-8C92-D7E584E969B3}" type="datetimeFigureOut">
               <a:rPr lang="en-US" smtClean="0"/>
-              <a:t>19-Jun-15</a:t>
+              <a:t>24-Jun-15</a:t>
             </a:fld>
             <a:endParaRPr lang="en-US"/>
           </a:p>
@@ -8778,7 +8778,7 @@
           <a:p>
             <a:fld id="{699DC775-C286-4358-8C92-D7E584E969B3}" type="datetimeFigureOut">
               <a:rPr lang="en-US" smtClean="0"/>
-              <a:t>19-Jun-15</a:t>
+              <a:t>24-Jun-15</a:t>
             </a:fld>
             <a:endParaRPr lang="en-US"/>
           </a:p>
@@ -9294,7 +9294,7 @@
           <a:p>
             <a:fld id="{699DC775-C286-4358-8C92-D7E584E969B3}" type="datetimeFigureOut">
               <a:rPr lang="en-US" smtClean="0"/>
-              <a:t>19-Jun-15</a:t>
+              <a:t>24-Jun-15</a:t>
             </a:fld>
             <a:endParaRPr lang="en-US"/>
           </a:p>
@@ -9808,7 +9808,7 @@
           <a:p>
             <a:fld id="{699DC775-C286-4358-8C92-D7E584E969B3}" type="datetimeFigureOut">
               <a:rPr lang="en-US" smtClean="0"/>
-              <a:t>19-Jun-15</a:t>
+              <a:t>24-Jun-15</a:t>
             </a:fld>
             <a:endParaRPr lang="en-US"/>
           </a:p>
@@ -10210,7 +10210,7 @@
           <a:p>
             <a:pPr algn="ctr"/>
             <a:r>
-              <a:rPr lang="en-US" b="1" smtClean="0">
+              <a:rPr lang="en-US" b="1" dirty="0" smtClean="0">
                 <a:solidFill>
                   <a:srgbClr val="FFFF00"/>
                 </a:solidFill>
@@ -10221,14 +10221,14 @@
           <a:p>
             <a:pPr algn="ctr"/>
             <a:r>
-              <a:rPr lang="en-US" smtClean="0">
+              <a:rPr lang="en-US" dirty="0" smtClean="0">
                 <a:solidFill>
                   <a:srgbClr val="FFFFFF"/>
                 </a:solidFill>
               </a:rPr>
               <a:t>Adjust the design of this slide and click the 'Sync Agenda' (in Agenda Lab) to replicate the design in the other slides.</a:t>
             </a:r>
-            <a:endParaRPr lang="en-US">
+            <a:endParaRPr lang="en-US" dirty="0">
               <a:solidFill>
                 <a:srgbClr val="FFFFFF"/>
               </a:solidFill>
@@ -10621,6 +10621,262 @@
           </a:p>
         </p:txBody>
       </p:sp>
+      <p:pic>
+        <p:nvPicPr>
+          <p:cNvPr id="12" name="PptLabsAgenda_&amp;^@VisualAgendaImage_&amp;^@One Slide_2"/>
+          <p:cNvPicPr>
+            <a:picLocks noChangeAspect="1" noChangeArrowheads="1"/>
+          </p:cNvPicPr>
+          <p:nvPr/>
+        </p:nvPicPr>
+        <p:blipFill>
+          <a:blip r:embed="rId3" cstate="print">
+            <a:extLst>
+              <a:ext uri="{28A0092B-C50C-407E-A947-70E740481C1C}">
+                <a14:useLocalDpi xmlns:a14="http://schemas.microsoft.com/office/drawing/2010/main" val="0"/>
+              </a:ext>
+            </a:extLst>
+          </a:blip>
+          <a:srcRect/>
+          <a:stretch>
+            <a:fillRect/>
+          </a:stretch>
+        </p:blipFill>
+        <p:spPr bwMode="auto">
+          <a:xfrm>
+            <a:off x="48880" y="2057400"/>
+            <a:ext cx="2804160" cy="2103120"/>
+          </a:xfrm>
+          <a:prstGeom prst="rect">
+            <a:avLst/>
+          </a:prstGeom>
+          <a:noFill/>
+          <a:ln>
+            <a:noFill/>
+          </a:ln>
+          <a:effectLst/>
+          <a:extLst>
+            <a:ext uri="{909E8E84-426E-40DD-AFC4-6F175D3DCCD1}">
+              <a14:hiddenFill xmlns:a14="http://schemas.microsoft.com/office/drawing/2010/main">
+                <a:solidFill>
+                  <a:schemeClr val="accent1"/>
+                </a:solidFill>
+              </a14:hiddenFill>
+            </a:ext>
+            <a:ext uri="{91240B29-F687-4F45-9708-019B960494DF}">
+              <a14:hiddenLine xmlns:a14="http://schemas.microsoft.com/office/drawing/2010/main" w="9525">
+                <a:solidFill>
+                  <a:schemeClr val="tx1"/>
+                </a:solidFill>
+                <a:miter lim="800000"/>
+                <a:headEnd/>
+                <a:tailEnd/>
+              </a14:hiddenLine>
+            </a:ext>
+            <a:ext uri="{AF507438-7753-43E0-B8FC-AC1667EBCBE1}">
+              <a14:hiddenEffects xmlns:a14="http://schemas.microsoft.com/office/drawing/2010/main">
+                <a:effectLst>
+                  <a:outerShdw dist="35921" dir="2700000" algn="ctr" rotWithShape="0">
+                    <a:schemeClr val="bg2"/>
+                  </a:outerShdw>
+                </a:effectLst>
+              </a14:hiddenEffects>
+            </a:ext>
+          </a:extLst>
+        </p:spPr>
+      </p:pic>
+      <p:pic>
+        <p:nvPicPr>
+          <p:cNvPr id="13" name="PptLabsAgenda_&amp;^@VisualAgendaImage_&amp;^@One Slide_2"/>
+          <p:cNvPicPr>
+            <a:picLocks noChangeAspect="1" noChangeArrowheads="1"/>
+          </p:cNvPicPr>
+          <p:nvPr/>
+        </p:nvPicPr>
+        <p:blipFill>
+          <a:blip r:embed="rId3" cstate="print">
+            <a:extLst>
+              <a:ext uri="{28A0092B-C50C-407E-A947-70E740481C1C}">
+                <a14:useLocalDpi xmlns:a14="http://schemas.microsoft.com/office/drawing/2010/main" val="0"/>
+              </a:ext>
+            </a:extLst>
+          </a:blip>
+          <a:srcRect/>
+          <a:stretch>
+            <a:fillRect/>
+          </a:stretch>
+        </p:blipFill>
+        <p:spPr bwMode="auto">
+          <a:xfrm>
+            <a:off x="381000" y="2651760"/>
+            <a:ext cx="2804160" cy="2103120"/>
+          </a:xfrm>
+          <a:prstGeom prst="rect">
+            <a:avLst/>
+          </a:prstGeom>
+          <a:noFill/>
+          <a:ln>
+            <a:noFill/>
+          </a:ln>
+          <a:effectLst/>
+          <a:extLst>
+            <a:ext uri="{909E8E84-426E-40DD-AFC4-6F175D3DCCD1}">
+              <a14:hiddenFill xmlns:a14="http://schemas.microsoft.com/office/drawing/2010/main">
+                <a:solidFill>
+                  <a:schemeClr val="accent1"/>
+                </a:solidFill>
+              </a14:hiddenFill>
+            </a:ext>
+            <a:ext uri="{91240B29-F687-4F45-9708-019B960494DF}">
+              <a14:hiddenLine xmlns:a14="http://schemas.microsoft.com/office/drawing/2010/main" w="9525">
+                <a:solidFill>
+                  <a:schemeClr val="tx1"/>
+                </a:solidFill>
+                <a:miter lim="800000"/>
+                <a:headEnd/>
+                <a:tailEnd/>
+              </a14:hiddenLine>
+            </a:ext>
+            <a:ext uri="{AF507438-7753-43E0-B8FC-AC1667EBCBE1}">
+              <a14:hiddenEffects xmlns:a14="http://schemas.microsoft.com/office/drawing/2010/main">
+                <a:effectLst>
+                  <a:outerShdw dist="35921" dir="2700000" algn="ctr" rotWithShape="0">
+                    <a:schemeClr val="bg2"/>
+                  </a:outerShdw>
+                </a:effectLst>
+              </a14:hiddenEffects>
+            </a:ext>
+          </a:extLst>
+        </p:spPr>
+      </p:pic>
+      <p:pic>
+        <p:nvPicPr>
+          <p:cNvPr id="14" name="PptLabsAgenda_&amp;^@VisualAgendaImage_&amp;^@One Slide_2"/>
+          <p:cNvPicPr>
+            <a:picLocks noChangeAspect="1" noChangeArrowheads="1"/>
+          </p:cNvPicPr>
+          <p:nvPr/>
+        </p:nvPicPr>
+        <p:blipFill>
+          <a:blip r:embed="rId3" cstate="print">
+            <a:extLst>
+              <a:ext uri="{28A0092B-C50C-407E-A947-70E740481C1C}">
+                <a14:useLocalDpi xmlns:a14="http://schemas.microsoft.com/office/drawing/2010/main" val="0"/>
+              </a:ext>
+            </a:extLst>
+          </a:blip>
+          <a:srcRect/>
+          <a:stretch>
+            <a:fillRect/>
+          </a:stretch>
+        </p:blipFill>
+        <p:spPr bwMode="auto">
+          <a:xfrm>
+            <a:off x="0" y="3108960"/>
+            <a:ext cx="2804160" cy="2103120"/>
+          </a:xfrm>
+          <a:prstGeom prst="rect">
+            <a:avLst/>
+          </a:prstGeom>
+          <a:noFill/>
+          <a:ln>
+            <a:noFill/>
+          </a:ln>
+          <a:effectLst/>
+          <a:extLst>
+            <a:ext uri="{909E8E84-426E-40DD-AFC4-6F175D3DCCD1}">
+              <a14:hiddenFill xmlns:a14="http://schemas.microsoft.com/office/drawing/2010/main">
+                <a:solidFill>
+                  <a:schemeClr val="accent1"/>
+                </a:solidFill>
+              </a14:hiddenFill>
+            </a:ext>
+            <a:ext uri="{91240B29-F687-4F45-9708-019B960494DF}">
+              <a14:hiddenLine xmlns:a14="http://schemas.microsoft.com/office/drawing/2010/main" w="9525">
+                <a:solidFill>
+                  <a:schemeClr val="tx1"/>
+                </a:solidFill>
+                <a:miter lim="800000"/>
+                <a:headEnd/>
+                <a:tailEnd/>
+              </a14:hiddenLine>
+            </a:ext>
+            <a:ext uri="{AF507438-7753-43E0-B8FC-AC1667EBCBE1}">
+              <a14:hiddenEffects xmlns:a14="http://schemas.microsoft.com/office/drawing/2010/main">
+                <a:effectLst>
+                  <a:outerShdw dist="35921" dir="2700000" algn="ctr" rotWithShape="0">
+                    <a:schemeClr val="bg2"/>
+                  </a:outerShdw>
+                </a:effectLst>
+              </a14:hiddenEffects>
+            </a:ext>
+          </a:extLst>
+        </p:spPr>
+      </p:pic>
+      <p:pic>
+        <p:nvPicPr>
+          <p:cNvPr id="27" name="PptLabsAgenda_&amp;^@VisualAgendaImage_&amp;^@Same Name_4"/>
+          <p:cNvPicPr>
+            <a:picLocks noChangeAspect="1" noChangeArrowheads="1"/>
+          </p:cNvPicPr>
+          <p:nvPr/>
+        </p:nvPicPr>
+        <p:blipFill>
+          <a:blip r:embed="rId4" cstate="print">
+            <a:extLst>
+              <a:ext uri="{28A0092B-C50C-407E-A947-70E740481C1C}">
+                <a14:useLocalDpi xmlns:a14="http://schemas.microsoft.com/office/drawing/2010/main" val="0"/>
+              </a:ext>
+            </a:extLst>
+          </a:blip>
+          <a:srcRect/>
+          <a:stretch>
+            <a:fillRect/>
+          </a:stretch>
+        </p:blipFill>
+        <p:spPr bwMode="auto">
+          <a:xfrm>
+            <a:off x="6471920" y="2057400"/>
+            <a:ext cx="3210560" cy="2407920"/>
+          </a:xfrm>
+          <a:prstGeom prst="rect">
+            <a:avLst/>
+          </a:prstGeom>
+          <a:noFill/>
+          <a:ln>
+            <a:noFill/>
+          </a:ln>
+          <a:effectLst/>
+          <a:extLst>
+            <a:ext uri="{909E8E84-426E-40DD-AFC4-6F175D3DCCD1}">
+              <a14:hiddenFill xmlns:a14="http://schemas.microsoft.com/office/drawing/2010/main">
+                <a:solidFill>
+                  <a:schemeClr val="accent1"/>
+                </a:solidFill>
+              </a14:hiddenFill>
+            </a:ext>
+            <a:ext uri="{91240B29-F687-4F45-9708-019B960494DF}">
+              <a14:hiddenLine xmlns:a14="http://schemas.microsoft.com/office/drawing/2010/main" w="9525">
+                <a:solidFill>
+                  <a:schemeClr val="tx1"/>
+                </a:solidFill>
+                <a:miter lim="800000"/>
+                <a:headEnd/>
+                <a:tailEnd/>
+              </a14:hiddenLine>
+            </a:ext>
+            <a:ext uri="{AF507438-7753-43E0-B8FC-AC1667EBCBE1}">
+              <a14:hiddenEffects xmlns:a14="http://schemas.microsoft.com/office/drawing/2010/main">
+                <a:effectLst>
+                  <a:outerShdw dist="35921" dir="2700000" algn="ctr" rotWithShape="0">
+                    <a:schemeClr val="bg2"/>
+                  </a:outerShdw>
+                </a:effectLst>
+              </a14:hiddenEffects>
+            </a:ext>
+          </a:extLst>
+        </p:spPr>
+      </p:pic>
     </p:spTree>
     <p:extLst>
       <p:ext uri="{BB962C8B-B14F-4D97-AF65-F5344CB8AC3E}">
@@ -10907,6 +11163,14 @@
   <p:clrMapOvr>
     <a:masterClrMapping/>
   </p:clrMapOvr>
+  <mc:AlternateContent xmlns:mc="http://schemas.openxmlformats.org/markup-compatibility/2006">
+    <mc:Choice xmlns:p14="http://schemas.microsoft.com/office/powerpoint/2010/main" Requires="p14">
+      <p:transition spd="slow" p14:dur="2000"/>
+    </mc:Choice>
+    <mc:Fallback>
+      <p:transition spd="slow"/>
+    </mc:Fallback>
+  </mc:AlternateContent>
   <p:timing>
     <p:tnLst>
       <p:par>

</xml_diff>